<commit_message>
Deleted slide for final presentation
</commit_message>
<xml_diff>
--- a/Wine_Quality_Prediction.pptx
+++ b/Wine_Quality_Prediction.pptx
@@ -5,7 +5,7 @@
     <p:sldMasterId id="2147483648" r:id="rId1"/>
   </p:sldMasterIdLst>
   <p:notesMasterIdLst>
-    <p:notesMasterId r:id="rId12"/>
+    <p:notesMasterId r:id="rId11"/>
   </p:notesMasterIdLst>
   <p:sldIdLst>
     <p:sldId id="258" r:id="rId2"/>
@@ -14,10 +14,9 @@
     <p:sldId id="300" r:id="rId5"/>
     <p:sldId id="304" r:id="rId6"/>
     <p:sldId id="305" r:id="rId7"/>
-    <p:sldId id="273" r:id="rId8"/>
-    <p:sldId id="274" r:id="rId9"/>
-    <p:sldId id="303" r:id="rId10"/>
-    <p:sldId id="276" r:id="rId11"/>
+    <p:sldId id="274" r:id="rId8"/>
+    <p:sldId id="303" r:id="rId9"/>
+    <p:sldId id="276" r:id="rId10"/>
   </p:sldIdLst>
   <p:sldSz cx="12192000" cy="6858000"/>
   <p:notesSz cx="6858000" cy="9144000"/>
@@ -666,199 +665,6 @@
 </p:notes>
 </file>
 
-<file path=ppt/notesSlides/notesSlide10.xml><?xml version="1.0" encoding="utf-8"?>
-<p:notes xmlns:a="http://schemas.openxmlformats.org/drawingml/2006/main" xmlns:r="http://schemas.openxmlformats.org/officeDocument/2006/relationships" xmlns:p="http://schemas.openxmlformats.org/presentationml/2006/main" showMasterSp="0" showMasterPhAnim="0">
-  <p:cSld>
-    <p:spTree>
-      <p:nvGrpSpPr>
-        <p:cNvPr id="1" name="Shape 891">
-          <a:extLst>
-            <a:ext uri="{FF2B5EF4-FFF2-40B4-BE49-F238E27FC236}">
-              <a16:creationId xmlns:a16="http://schemas.microsoft.com/office/drawing/2014/main" id="{1B3F8FD3-53C6-3E03-2735-288FEBB9F3DE}"/>
-            </a:ext>
-          </a:extLst>
-        </p:cNvPr>
-        <p:cNvGrpSpPr/>
-        <p:nvPr/>
-      </p:nvGrpSpPr>
-      <p:grpSpPr>
-        <a:xfrm>
-          <a:off x="0" y="0"/>
-          <a:ext cx="0" cy="0"/>
-          <a:chOff x="0" y="0"/>
-          <a:chExt cx="0" cy="0"/>
-        </a:xfrm>
-      </p:grpSpPr>
-      <p:sp>
-        <p:nvSpPr>
-          <p:cNvPr id="892" name="Google Shape;892;g3290d45164b_0_508:notes">
-            <a:extLst>
-              <a:ext uri="{FF2B5EF4-FFF2-40B4-BE49-F238E27FC236}">
-                <a16:creationId xmlns:a16="http://schemas.microsoft.com/office/drawing/2014/main" id="{6FCAF217-53C1-B5D9-041D-A473C8FA4992}"/>
-              </a:ext>
-            </a:extLst>
-          </p:cNvPr>
-          <p:cNvSpPr>
-            <a:spLocks noGrp="1" noRot="1" noChangeAspect="1"/>
-          </p:cNvSpPr>
-          <p:nvPr>
-            <p:ph type="sldImg" idx="2"/>
-          </p:nvPr>
-        </p:nvSpPr>
-        <p:spPr>
-          <a:xfrm>
-            <a:off x="685800" y="1143000"/>
-            <a:ext cx="5486400" cy="3086100"/>
-          </a:xfrm>
-          <a:custGeom>
-            <a:avLst/>
-            <a:gdLst/>
-            <a:ahLst/>
-            <a:cxnLst/>
-            <a:rect l="l" t="t" r="r" b="b"/>
-            <a:pathLst>
-              <a:path w="120000" h="120000" extrusionOk="0">
-                <a:moveTo>
-                  <a:pt x="0" y="0"/>
-                </a:moveTo>
-                <a:lnTo>
-                  <a:pt x="120000" y="0"/>
-                </a:lnTo>
-                <a:lnTo>
-                  <a:pt x="120000" y="120000"/>
-                </a:lnTo>
-                <a:lnTo>
-                  <a:pt x="0" y="120000"/>
-                </a:lnTo>
-                <a:close/>
-              </a:path>
-            </a:pathLst>
-          </a:custGeom>
-          <a:noFill/>
-          <a:ln w="12700" cap="flat" cmpd="sng">
-            <a:solidFill>
-              <a:srgbClr val="000000"/>
-            </a:solidFill>
-            <a:prstDash val="solid"/>
-            <a:round/>
-            <a:headEnd type="none" w="sm" len="sm"/>
-            <a:tailEnd type="none" w="sm" len="sm"/>
-          </a:ln>
-        </p:spPr>
-      </p:sp>
-      <p:sp>
-        <p:nvSpPr>
-          <p:cNvPr id="893" name="Google Shape;893;g3290d45164b_0_508:notes">
-            <a:extLst>
-              <a:ext uri="{FF2B5EF4-FFF2-40B4-BE49-F238E27FC236}">
-                <a16:creationId xmlns:a16="http://schemas.microsoft.com/office/drawing/2014/main" id="{55A08073-FA88-D7B4-E406-46653A7752EF}"/>
-              </a:ext>
-            </a:extLst>
-          </p:cNvPr>
-          <p:cNvSpPr txBox="1">
-            <a:spLocks noGrp="1"/>
-          </p:cNvSpPr>
-          <p:nvPr>
-            <p:ph type="body" idx="1"/>
-          </p:nvPr>
-        </p:nvSpPr>
-        <p:spPr>
-          <a:xfrm>
-            <a:off x="685800" y="4400550"/>
-            <a:ext cx="5486400" cy="3600600"/>
-          </a:xfrm>
-          <a:prstGeom prst="rect">
-            <a:avLst/>
-          </a:prstGeom>
-          <a:noFill/>
-          <a:ln>
-            <a:noFill/>
-          </a:ln>
-        </p:spPr>
-        <p:txBody>
-          <a:bodyPr spcFirstLastPara="1" wrap="square" lIns="91425" tIns="45700" rIns="91425" bIns="45700" anchor="t" anchorCtr="0">
-            <a:noAutofit/>
-          </a:bodyPr>
-          <a:lstStyle/>
-          <a:p>
-            <a:pPr marL="0" lvl="0" indent="0" algn="l" rtl="0">
-              <a:spcBef>
-                <a:spcPts val="0"/>
-              </a:spcBef>
-              <a:spcAft>
-                <a:spcPts val="0"/>
-              </a:spcAft>
-              <a:buNone/>
-            </a:pPr>
-            <a:endParaRPr dirty="0"/>
-          </a:p>
-        </p:txBody>
-      </p:sp>
-      <p:sp>
-        <p:nvSpPr>
-          <p:cNvPr id="894" name="Google Shape;894;g3290d45164b_0_508:notes">
-            <a:extLst>
-              <a:ext uri="{FF2B5EF4-FFF2-40B4-BE49-F238E27FC236}">
-                <a16:creationId xmlns:a16="http://schemas.microsoft.com/office/drawing/2014/main" id="{CAC4606B-9484-576D-DB09-32EE99340730}"/>
-              </a:ext>
-            </a:extLst>
-          </p:cNvPr>
-          <p:cNvSpPr txBox="1">
-            <a:spLocks noGrp="1"/>
-          </p:cNvSpPr>
-          <p:nvPr>
-            <p:ph type="sldNum" idx="12"/>
-          </p:nvPr>
-        </p:nvSpPr>
-        <p:spPr>
-          <a:xfrm>
-            <a:off x="3884613" y="8685213"/>
-            <a:ext cx="2971800" cy="458700"/>
-          </a:xfrm>
-          <a:prstGeom prst="rect">
-            <a:avLst/>
-          </a:prstGeom>
-          <a:noFill/>
-          <a:ln>
-            <a:noFill/>
-          </a:ln>
-        </p:spPr>
-        <p:txBody>
-          <a:bodyPr spcFirstLastPara="1" wrap="square" lIns="91425" tIns="45700" rIns="91425" bIns="45700" anchor="b" anchorCtr="0">
-            <a:noAutofit/>
-          </a:bodyPr>
-          <a:lstStyle/>
-          <a:p>
-            <a:pPr marL="0" lvl="0" indent="0" algn="r" rtl="0">
-              <a:spcBef>
-                <a:spcPts val="0"/>
-              </a:spcBef>
-              <a:spcAft>
-                <a:spcPts val="0"/>
-              </a:spcAft>
-              <a:buNone/>
-            </a:pPr>
-            <a:fld id="{00000000-1234-1234-1234-123412341234}" type="slidenum">
-              <a:rPr lang="en-US"/>
-              <a:t>10</a:t>
-            </a:fld>
-            <a:endParaRPr/>
-          </a:p>
-        </p:txBody>
-      </p:sp>
-    </p:spTree>
-    <p:extLst>
-      <p:ext uri="{BB962C8B-B14F-4D97-AF65-F5344CB8AC3E}">
-        <p14:creationId xmlns:p14="http://schemas.microsoft.com/office/powerpoint/2010/main" val="2341138648"/>
-      </p:ext>
-    </p:extLst>
-  </p:cSld>
-  <p:clrMapOvr>
-    <a:masterClrMapping/>
-  </p:clrMapOvr>
-</p:notes>
-</file>
-
 <file path=ppt/notesSlides/notesSlide2.xml><?xml version="1.0" encoding="utf-8"?>
 <p:notes xmlns:a="http://schemas.openxmlformats.org/drawingml/2006/main" xmlns:r="http://schemas.openxmlformats.org/officeDocument/2006/relationships" xmlns:p="http://schemas.openxmlformats.org/presentationml/2006/main" showMasterSp="0" showMasterPhAnim="0">
   <p:cSld>
@@ -1832,7 +1638,7 @@
         <p:cNvPr id="1" name="Shape 891">
           <a:extLst>
             <a:ext uri="{FF2B5EF4-FFF2-40B4-BE49-F238E27FC236}">
-              <a16:creationId xmlns:a16="http://schemas.microsoft.com/office/drawing/2014/main" id="{C049F3CB-736A-1355-1FA3-9482B1813062}"/>
+              <a16:creationId xmlns:a16="http://schemas.microsoft.com/office/drawing/2014/main" id="{D4B47452-B8E6-02E8-B819-DE9720D2DA36}"/>
             </a:ext>
           </a:extLst>
         </p:cNvPr>
@@ -1852,7 +1658,7 @@
           <p:cNvPr id="892" name="Google Shape;892;g3290d45164b_0_508:notes">
             <a:extLst>
               <a:ext uri="{FF2B5EF4-FFF2-40B4-BE49-F238E27FC236}">
-                <a16:creationId xmlns:a16="http://schemas.microsoft.com/office/drawing/2014/main" id="{ED0B9677-BCDB-8CD6-397C-D29E060C02C1}"/>
+                <a16:creationId xmlns:a16="http://schemas.microsoft.com/office/drawing/2014/main" id="{9DB18D48-7146-1D7A-B0AA-FA4D7821653B}"/>
               </a:ext>
             </a:extLst>
           </p:cNvPr>
@@ -1909,7 +1715,7 @@
           <p:cNvPr id="893" name="Google Shape;893;g3290d45164b_0_508:notes">
             <a:extLst>
               <a:ext uri="{FF2B5EF4-FFF2-40B4-BE49-F238E27FC236}">
-                <a16:creationId xmlns:a16="http://schemas.microsoft.com/office/drawing/2014/main" id="{F932FCC1-02A7-98A1-B2BB-E7727F373C4D}"/>
+                <a16:creationId xmlns:a16="http://schemas.microsoft.com/office/drawing/2014/main" id="{8B3F5BCF-A756-AA24-A7DD-69D7506FC082}"/>
               </a:ext>
             </a:extLst>
           </p:cNvPr>
@@ -1938,137 +1744,6 @@
             <a:noAutofit/>
           </a:bodyPr>
           <a:lstStyle/>
-          <a:p>
-            <a:r>
-              <a:rPr lang="en-US" b="0" dirty="0"/>
-              <a:t>The confusion matrix provides a detailed breakdown of how well the Random Forest model classifies wine quality.  </a:t>
-            </a:r>
-            <a:br>
-              <a:rPr lang="en-US" b="0" dirty="0"/>
-            </a:br>
-            <a:br>
-              <a:rPr lang="en-US" b="0" dirty="0"/>
-            </a:br>
-            <a:r>
-              <a:rPr lang="en-US" b="0" dirty="0"/>
-              <a:t>Instead of just giving an overall accuracy score, it tells us the following:</a:t>
-            </a:r>
-            <a:br>
-              <a:rPr lang="en-US" b="0" dirty="0"/>
-            </a:br>
-            <a:endParaRPr lang="en-US" b="0" dirty="0"/>
-          </a:p>
-          <a:p>
-            <a:pPr>
-              <a:buFont typeface="+mj-lt"/>
-              <a:buAutoNum type="arabicPeriod"/>
-            </a:pPr>
-            <a:r>
-              <a:rPr lang="en-US" b="0" dirty="0"/>
-              <a:t>How many correct and incorrect predictions were made for each class.</a:t>
-            </a:r>
-          </a:p>
-          <a:p>
-            <a:pPr>
-              <a:buFont typeface="+mj-lt"/>
-              <a:buAutoNum type="arabicPeriod"/>
-            </a:pPr>
-            <a:endParaRPr lang="en-US" b="0" dirty="0"/>
-          </a:p>
-          <a:p>
-            <a:pPr marL="742950" lvl="1" indent="-285750">
-              <a:buFont typeface="+mj-lt"/>
-              <a:buAutoNum type="arabicPeriod"/>
-            </a:pPr>
-            <a:r>
-              <a:rPr lang="en-US" b="0" dirty="0"/>
-              <a:t>225 True Negatives (Low Quality correctly classified)</a:t>
-            </a:r>
-          </a:p>
-          <a:p>
-            <a:pPr marL="742950" lvl="1" indent="-285750">
-              <a:buFont typeface="+mj-lt"/>
-              <a:buAutoNum type="arabicPeriod"/>
-            </a:pPr>
-            <a:r>
-              <a:rPr lang="en-US" b="0" dirty="0"/>
-              <a:t>274 True Positives (High Quality correctly classified)</a:t>
-            </a:r>
-          </a:p>
-          <a:p>
-            <a:pPr marL="742950" lvl="1" indent="-285750">
-              <a:buFont typeface="+mj-lt"/>
-              <a:buAutoNum type="arabicPeriod"/>
-            </a:pPr>
-            <a:r>
-              <a:rPr lang="en-US" b="0" dirty="0"/>
-              <a:t>85 False Positives (Low Quality misclassified as High Quality)</a:t>
-            </a:r>
-          </a:p>
-          <a:p>
-            <a:pPr marL="742950" lvl="1" indent="-285750">
-              <a:buFont typeface="+mj-lt"/>
-              <a:buAutoNum type="arabicPeriod"/>
-            </a:pPr>
-            <a:r>
-              <a:rPr lang="en-US" b="0" dirty="0"/>
-              <a:t>56 False Negatives (High Quality misclassified as Low Quality)</a:t>
-            </a:r>
-          </a:p>
-          <a:p>
-            <a:pPr marL="742950" lvl="1" indent="-285750">
-              <a:buFont typeface="+mj-lt"/>
-              <a:buAutoNum type="arabicPeriod"/>
-            </a:pPr>
-            <a:endParaRPr lang="en-US" b="0" dirty="0"/>
-          </a:p>
-          <a:p>
-            <a:pPr>
-              <a:buFont typeface="+mj-lt"/>
-              <a:buAutoNum type="arabicPeriod"/>
-            </a:pPr>
-            <a:r>
-              <a:rPr lang="en-US" b="0" dirty="0"/>
-              <a:t> It also gives insight into model performance beyond just accuracy.</a:t>
-            </a:r>
-          </a:p>
-          <a:p>
-            <a:pPr>
-              <a:buFont typeface="+mj-lt"/>
-              <a:buAutoNum type="arabicPeriod"/>
-            </a:pPr>
-            <a:endParaRPr lang="en-US" b="0" dirty="0"/>
-          </a:p>
-          <a:p>
-            <a:pPr marL="742950" lvl="1" indent="-285750">
-              <a:buFont typeface="+mj-lt"/>
-              <a:buAutoNum type="arabicPeriod"/>
-            </a:pPr>
-            <a:r>
-              <a:rPr lang="en-US" b="0" dirty="0"/>
-              <a:t>Accuracy alone doesn't tell us which types of errors the model is making.</a:t>
-            </a:r>
-          </a:p>
-          <a:p>
-            <a:pPr marL="742950" lvl="1" indent="-285750">
-              <a:buFont typeface="+mj-lt"/>
-              <a:buAutoNum type="arabicPeriod"/>
-            </a:pPr>
-            <a:r>
-              <a:rPr lang="en-US" b="0" dirty="0"/>
-              <a:t>If False Positives are too high, the model may over-predict high-quality wines.</a:t>
-            </a:r>
-          </a:p>
-          <a:p>
-            <a:pPr marL="742950" lvl="1" indent="-285750">
-              <a:buFont typeface="+mj-lt"/>
-              <a:buAutoNum type="arabicPeriod"/>
-            </a:pPr>
-            <a:r>
-              <a:rPr lang="en-US" b="0" dirty="0"/>
-              <a:t>If False Negatives are too high, the model may be too strict in classifying wines as low quality.</a:t>
-            </a:r>
-          </a:p>
           <a:p>
             <a:pPr marL="0" lvl="0" indent="0" algn="l" rtl="0">
               <a:spcBef>
@@ -2079,7 +1754,7 @@
               </a:spcAft>
               <a:buNone/>
             </a:pPr>
-            <a:endParaRPr b="0" dirty="0"/>
+            <a:endParaRPr dirty="0"/>
           </a:p>
         </p:txBody>
       </p:sp>
@@ -2088,7 +1763,7 @@
           <p:cNvPr id="894" name="Google Shape;894;g3290d45164b_0_508:notes">
             <a:extLst>
               <a:ext uri="{FF2B5EF4-FFF2-40B4-BE49-F238E27FC236}">
-                <a16:creationId xmlns:a16="http://schemas.microsoft.com/office/drawing/2014/main" id="{138B179B-434F-1D4E-13C6-888A0C1D0122}"/>
+                <a16:creationId xmlns:a16="http://schemas.microsoft.com/office/drawing/2014/main" id="{3D568FD8-0CA9-8E7C-D28E-DF6C8E698207}"/>
               </a:ext>
             </a:extLst>
           </p:cNvPr>
@@ -2138,7 +1813,7 @@
     </p:spTree>
     <p:extLst>
       <p:ext uri="{BB962C8B-B14F-4D97-AF65-F5344CB8AC3E}">
-        <p14:creationId xmlns:p14="http://schemas.microsoft.com/office/powerpoint/2010/main" val="2116828560"/>
+        <p14:creationId xmlns:p14="http://schemas.microsoft.com/office/powerpoint/2010/main" val="1311632752"/>
       </p:ext>
     </p:extLst>
   </p:cSld>
@@ -2156,7 +1831,7 @@
         <p:cNvPr id="1" name="Shape 891">
           <a:extLst>
             <a:ext uri="{FF2B5EF4-FFF2-40B4-BE49-F238E27FC236}">
-              <a16:creationId xmlns:a16="http://schemas.microsoft.com/office/drawing/2014/main" id="{D4B47452-B8E6-02E8-B819-DE9720D2DA36}"/>
+              <a16:creationId xmlns:a16="http://schemas.microsoft.com/office/drawing/2014/main" id="{3BB7EC99-546E-C51B-43A2-370D6A74F123}"/>
             </a:ext>
           </a:extLst>
         </p:cNvPr>
@@ -2176,7 +1851,7 @@
           <p:cNvPr id="892" name="Google Shape;892;g3290d45164b_0_508:notes">
             <a:extLst>
               <a:ext uri="{FF2B5EF4-FFF2-40B4-BE49-F238E27FC236}">
-                <a16:creationId xmlns:a16="http://schemas.microsoft.com/office/drawing/2014/main" id="{9DB18D48-7146-1D7A-B0AA-FA4D7821653B}"/>
+                <a16:creationId xmlns:a16="http://schemas.microsoft.com/office/drawing/2014/main" id="{DAEBECA7-64D1-49FE-1DC0-E105EAD6DF9D}"/>
               </a:ext>
             </a:extLst>
           </p:cNvPr>
@@ -2233,7 +1908,7 @@
           <p:cNvPr id="893" name="Google Shape;893;g3290d45164b_0_508:notes">
             <a:extLst>
               <a:ext uri="{FF2B5EF4-FFF2-40B4-BE49-F238E27FC236}">
-                <a16:creationId xmlns:a16="http://schemas.microsoft.com/office/drawing/2014/main" id="{8B3F5BCF-A756-AA24-A7DD-69D7506FC082}"/>
+                <a16:creationId xmlns:a16="http://schemas.microsoft.com/office/drawing/2014/main" id="{043B53CB-7FBA-57F4-12AC-D79C23F9E9C5}"/>
               </a:ext>
             </a:extLst>
           </p:cNvPr>
@@ -2281,7 +1956,7 @@
           <p:cNvPr id="894" name="Google Shape;894;g3290d45164b_0_508:notes">
             <a:extLst>
               <a:ext uri="{FF2B5EF4-FFF2-40B4-BE49-F238E27FC236}">
-                <a16:creationId xmlns:a16="http://schemas.microsoft.com/office/drawing/2014/main" id="{3D568FD8-0CA9-8E7C-D28E-DF6C8E698207}"/>
+                <a16:creationId xmlns:a16="http://schemas.microsoft.com/office/drawing/2014/main" id="{6A100DEB-4E1A-3AC3-634E-50B2301295D2}"/>
               </a:ext>
             </a:extLst>
           </p:cNvPr>
@@ -2331,7 +2006,7 @@
     </p:spTree>
     <p:extLst>
       <p:ext uri="{BB962C8B-B14F-4D97-AF65-F5344CB8AC3E}">
-        <p14:creationId xmlns:p14="http://schemas.microsoft.com/office/powerpoint/2010/main" val="1311632752"/>
+        <p14:creationId xmlns:p14="http://schemas.microsoft.com/office/powerpoint/2010/main" val="4280881776"/>
       </p:ext>
     </p:extLst>
   </p:cSld>
@@ -2349,7 +2024,7 @@
         <p:cNvPr id="1" name="Shape 891">
           <a:extLst>
             <a:ext uri="{FF2B5EF4-FFF2-40B4-BE49-F238E27FC236}">
-              <a16:creationId xmlns:a16="http://schemas.microsoft.com/office/drawing/2014/main" id="{3BB7EC99-546E-C51B-43A2-370D6A74F123}"/>
+              <a16:creationId xmlns:a16="http://schemas.microsoft.com/office/drawing/2014/main" id="{1B3F8FD3-53C6-3E03-2735-288FEBB9F3DE}"/>
             </a:ext>
           </a:extLst>
         </p:cNvPr>
@@ -2369,7 +2044,7 @@
           <p:cNvPr id="892" name="Google Shape;892;g3290d45164b_0_508:notes">
             <a:extLst>
               <a:ext uri="{FF2B5EF4-FFF2-40B4-BE49-F238E27FC236}">
-                <a16:creationId xmlns:a16="http://schemas.microsoft.com/office/drawing/2014/main" id="{DAEBECA7-64D1-49FE-1DC0-E105EAD6DF9D}"/>
+                <a16:creationId xmlns:a16="http://schemas.microsoft.com/office/drawing/2014/main" id="{6FCAF217-53C1-B5D9-041D-A473C8FA4992}"/>
               </a:ext>
             </a:extLst>
           </p:cNvPr>
@@ -2426,7 +2101,7 @@
           <p:cNvPr id="893" name="Google Shape;893;g3290d45164b_0_508:notes">
             <a:extLst>
               <a:ext uri="{FF2B5EF4-FFF2-40B4-BE49-F238E27FC236}">
-                <a16:creationId xmlns:a16="http://schemas.microsoft.com/office/drawing/2014/main" id="{043B53CB-7FBA-57F4-12AC-D79C23F9E9C5}"/>
+                <a16:creationId xmlns:a16="http://schemas.microsoft.com/office/drawing/2014/main" id="{55A08073-FA88-D7B4-E406-46653A7752EF}"/>
               </a:ext>
             </a:extLst>
           </p:cNvPr>
@@ -2474,7 +2149,7 @@
           <p:cNvPr id="894" name="Google Shape;894;g3290d45164b_0_508:notes">
             <a:extLst>
               <a:ext uri="{FF2B5EF4-FFF2-40B4-BE49-F238E27FC236}">
-                <a16:creationId xmlns:a16="http://schemas.microsoft.com/office/drawing/2014/main" id="{6A100DEB-4E1A-3AC3-634E-50B2301295D2}"/>
+                <a16:creationId xmlns:a16="http://schemas.microsoft.com/office/drawing/2014/main" id="{CAC4606B-9484-576D-DB09-32EE99340730}"/>
               </a:ext>
             </a:extLst>
           </p:cNvPr>
@@ -2524,7 +2199,7 @@
     </p:spTree>
     <p:extLst>
       <p:ext uri="{BB962C8B-B14F-4D97-AF65-F5344CB8AC3E}">
-        <p14:creationId xmlns:p14="http://schemas.microsoft.com/office/powerpoint/2010/main" val="4280881776"/>
+        <p14:creationId xmlns:p14="http://schemas.microsoft.com/office/powerpoint/2010/main" val="2341138648"/>
       </p:ext>
     </p:extLst>
   </p:cSld>
@@ -6120,143 +5795,6 @@
 </p:sld>
 </file>
 
-<file path=ppt/slides/slide10.xml><?xml version="1.0" encoding="utf-8"?>
-<p:sld xmlns:a="http://schemas.openxmlformats.org/drawingml/2006/main" xmlns:r="http://schemas.openxmlformats.org/officeDocument/2006/relationships" xmlns:p="http://schemas.openxmlformats.org/presentationml/2006/main">
-  <p:cSld>
-    <p:spTree>
-      <p:nvGrpSpPr>
-        <p:cNvPr id="1" name="Shape 895">
-          <a:extLst>
-            <a:ext uri="{FF2B5EF4-FFF2-40B4-BE49-F238E27FC236}">
-              <a16:creationId xmlns:a16="http://schemas.microsoft.com/office/drawing/2014/main" id="{E895A9F3-9E4C-5BCD-BA6D-11FEE807F80A}"/>
-            </a:ext>
-          </a:extLst>
-        </p:cNvPr>
-        <p:cNvGrpSpPr/>
-        <p:nvPr/>
-      </p:nvGrpSpPr>
-      <p:grpSpPr>
-        <a:xfrm>
-          <a:off x="0" y="0"/>
-          <a:ext cx="0" cy="0"/>
-          <a:chOff x="0" y="0"/>
-          <a:chExt cx="0" cy="0"/>
-        </a:xfrm>
-      </p:grpSpPr>
-      <p:pic>
-        <p:nvPicPr>
-          <p:cNvPr id="896" name="Google Shape;896;g3290d45164b_0_508">
-            <a:extLst>
-              <a:ext uri="{FF2B5EF4-FFF2-40B4-BE49-F238E27FC236}">
-                <a16:creationId xmlns:a16="http://schemas.microsoft.com/office/drawing/2014/main" id="{4B511626-2370-A31E-B4FC-A110AC2C26CE}"/>
-              </a:ext>
-            </a:extLst>
-          </p:cNvPr>
-          <p:cNvPicPr preferRelativeResize="0"/>
-          <p:nvPr/>
-        </p:nvPicPr>
-        <p:blipFill rotWithShape="1">
-          <a:blip r:embed="rId3">
-            <a:alphaModFix/>
-          </a:blip>
-          <a:srcRect/>
-          <a:stretch/>
-        </p:blipFill>
-        <p:spPr>
-          <a:xfrm>
-            <a:off x="0" y="0"/>
-            <a:ext cx="12192000" cy="6858000"/>
-          </a:xfrm>
-          <a:prstGeom prst="rect">
-            <a:avLst/>
-          </a:prstGeom>
-          <a:noFill/>
-          <a:ln>
-            <a:noFill/>
-          </a:ln>
-        </p:spPr>
-      </p:pic>
-      <p:sp>
-        <p:nvSpPr>
-          <p:cNvPr id="2" name="Google Shape;904;g3290d45164b_0_508">
-            <a:extLst>
-              <a:ext uri="{FF2B5EF4-FFF2-40B4-BE49-F238E27FC236}">
-                <a16:creationId xmlns:a16="http://schemas.microsoft.com/office/drawing/2014/main" id="{D6A86359-9B40-0F30-9CEC-C585AD08F271}"/>
-              </a:ext>
-            </a:extLst>
-          </p:cNvPr>
-          <p:cNvSpPr txBox="1"/>
-          <p:nvPr/>
-        </p:nvSpPr>
-        <p:spPr>
-          <a:xfrm>
-            <a:off x="4276578" y="2691060"/>
-            <a:ext cx="4241409" cy="1015622"/>
-          </a:xfrm>
-          <a:prstGeom prst="rect">
-            <a:avLst/>
-          </a:prstGeom>
-          <a:noFill/>
-          <a:ln>
-            <a:noFill/>
-          </a:ln>
-        </p:spPr>
-        <p:txBody>
-          <a:bodyPr spcFirstLastPara="1" wrap="square" lIns="91425" tIns="45700" rIns="91425" bIns="45700" anchor="t" anchorCtr="0">
-            <a:spAutoFit/>
-          </a:bodyPr>
-          <a:lstStyle/>
-          <a:p>
-            <a:pPr marL="0" marR="0" lvl="0" indent="0" algn="l" rtl="0">
-              <a:lnSpc>
-                <a:spcPct val="100000"/>
-              </a:lnSpc>
-              <a:spcBef>
-                <a:spcPts val="0"/>
-              </a:spcBef>
-              <a:spcAft>
-                <a:spcPts val="0"/>
-              </a:spcAft>
-              <a:buClr>
-                <a:srgbClr val="FFFFFF"/>
-              </a:buClr>
-              <a:buSzPts val="4000"/>
-              <a:buFont typeface="Calibri"/>
-              <a:buNone/>
-            </a:pPr>
-            <a:r>
-              <a:rPr lang="en-US" sz="6000" dirty="0">
-                <a:solidFill>
-                  <a:schemeClr val="bg1"/>
-                </a:solidFill>
-              </a:rPr>
-              <a:t>Questions?</a:t>
-            </a:r>
-            <a:endParaRPr sz="6000" b="1" i="0" u="none" strike="noStrike" cap="none" dirty="0">
-              <a:solidFill>
-                <a:schemeClr val="lt1"/>
-              </a:solidFill>
-              <a:latin typeface="Roboto"/>
-              <a:ea typeface="Roboto"/>
-              <a:cs typeface="Roboto"/>
-              <a:sym typeface="Roboto"/>
-            </a:endParaRPr>
-          </a:p>
-        </p:txBody>
-      </p:sp>
-    </p:spTree>
-    <p:extLst>
-      <p:ext uri="{BB962C8B-B14F-4D97-AF65-F5344CB8AC3E}">
-        <p14:creationId xmlns:p14="http://schemas.microsoft.com/office/powerpoint/2010/main" val="601873375"/>
-      </p:ext>
-    </p:extLst>
-  </p:cSld>
-  <p:clrMapOvr>
-    <a:masterClrMapping/>
-  </p:clrMapOvr>
-</p:sld>
-</file>
-
 <file path=ppt/slides/slide2.xml><?xml version="1.0" encoding="utf-8"?>
 <p:sld xmlns:a="http://schemas.openxmlformats.org/drawingml/2006/main" xmlns:r="http://schemas.openxmlformats.org/officeDocument/2006/relationships" xmlns:p="http://schemas.openxmlformats.org/presentationml/2006/main">
   <p:cSld>
@@ -8478,376 +8016,6 @@
         <p:cNvPr id="1" name="Shape 895">
           <a:extLst>
             <a:ext uri="{FF2B5EF4-FFF2-40B4-BE49-F238E27FC236}">
-              <a16:creationId xmlns:a16="http://schemas.microsoft.com/office/drawing/2014/main" id="{B7874614-F8D8-F987-0A1F-D7F514040D47}"/>
-            </a:ext>
-          </a:extLst>
-        </p:cNvPr>
-        <p:cNvGrpSpPr/>
-        <p:nvPr/>
-      </p:nvGrpSpPr>
-      <p:grpSpPr>
-        <a:xfrm>
-          <a:off x="0" y="0"/>
-          <a:ext cx="0" cy="0"/>
-          <a:chOff x="0" y="0"/>
-          <a:chExt cx="0" cy="0"/>
-        </a:xfrm>
-      </p:grpSpPr>
-      <p:pic>
-        <p:nvPicPr>
-          <p:cNvPr id="896" name="Google Shape;896;g3290d45164b_0_508">
-            <a:extLst>
-              <a:ext uri="{FF2B5EF4-FFF2-40B4-BE49-F238E27FC236}">
-                <a16:creationId xmlns:a16="http://schemas.microsoft.com/office/drawing/2014/main" id="{78351687-CB37-EF6D-04BC-5BE3247C2B05}"/>
-              </a:ext>
-            </a:extLst>
-          </p:cNvPr>
-          <p:cNvPicPr preferRelativeResize="0"/>
-          <p:nvPr/>
-        </p:nvPicPr>
-        <p:blipFill rotWithShape="1">
-          <a:blip r:embed="rId3">
-            <a:alphaModFix/>
-          </a:blip>
-          <a:srcRect/>
-          <a:stretch/>
-        </p:blipFill>
-        <p:spPr>
-          <a:xfrm>
-            <a:off x="0" y="0"/>
-            <a:ext cx="12192000" cy="6858000"/>
-          </a:xfrm>
-          <a:prstGeom prst="rect">
-            <a:avLst/>
-          </a:prstGeom>
-          <a:noFill/>
-          <a:ln>
-            <a:noFill/>
-          </a:ln>
-        </p:spPr>
-      </p:pic>
-      <p:sp>
-        <p:nvSpPr>
-          <p:cNvPr id="904" name="Google Shape;904;g3290d45164b_0_508">
-            <a:extLst>
-              <a:ext uri="{FF2B5EF4-FFF2-40B4-BE49-F238E27FC236}">
-                <a16:creationId xmlns:a16="http://schemas.microsoft.com/office/drawing/2014/main" id="{7BEC44AC-89AF-B79C-91A0-EECC75A44B98}"/>
-              </a:ext>
-            </a:extLst>
-          </p:cNvPr>
-          <p:cNvSpPr txBox="1"/>
-          <p:nvPr/>
-        </p:nvSpPr>
-        <p:spPr>
-          <a:xfrm>
-            <a:off x="0" y="595361"/>
-            <a:ext cx="9066000" cy="646500"/>
-          </a:xfrm>
-          <a:prstGeom prst="rect">
-            <a:avLst/>
-          </a:prstGeom>
-          <a:noFill/>
-          <a:ln>
-            <a:noFill/>
-          </a:ln>
-        </p:spPr>
-        <p:txBody>
-          <a:bodyPr spcFirstLastPara="1" wrap="square" lIns="91425" tIns="45700" rIns="91425" bIns="45700" anchor="t" anchorCtr="0">
-            <a:spAutoFit/>
-          </a:bodyPr>
-          <a:lstStyle/>
-          <a:p>
-            <a:pPr marL="0" marR="0" lvl="0" indent="0" algn="l" rtl="0">
-              <a:lnSpc>
-                <a:spcPct val="100000"/>
-              </a:lnSpc>
-              <a:spcBef>
-                <a:spcPts val="0"/>
-              </a:spcBef>
-              <a:spcAft>
-                <a:spcPts val="0"/>
-              </a:spcAft>
-              <a:buClr>
-                <a:srgbClr val="FFFFFF"/>
-              </a:buClr>
-              <a:buSzPts val="4000"/>
-              <a:buFont typeface="Calibri"/>
-              <a:buNone/>
-            </a:pPr>
-            <a:r>
-              <a:rPr lang="en-US" sz="3600" dirty="0">
-                <a:solidFill>
-                  <a:schemeClr val="bg1"/>
-                </a:solidFill>
-              </a:rPr>
-              <a:t>Model Selection &amp; Best Model</a:t>
-            </a:r>
-            <a:endParaRPr sz="3600" b="1" i="0" u="none" strike="noStrike" cap="none" dirty="0">
-              <a:solidFill>
-                <a:schemeClr val="bg1"/>
-              </a:solidFill>
-              <a:latin typeface="Roboto"/>
-              <a:ea typeface="Roboto"/>
-              <a:cs typeface="Roboto"/>
-              <a:sym typeface="Roboto"/>
-            </a:endParaRPr>
-          </a:p>
-        </p:txBody>
-      </p:sp>
-      <p:cxnSp>
-        <p:nvCxnSpPr>
-          <p:cNvPr id="915" name="Google Shape;915;g3290d45164b_0_508">
-            <a:extLst>
-              <a:ext uri="{FF2B5EF4-FFF2-40B4-BE49-F238E27FC236}">
-                <a16:creationId xmlns:a16="http://schemas.microsoft.com/office/drawing/2014/main" id="{0C395702-4A30-1636-800F-91FCB55F6170}"/>
-              </a:ext>
-            </a:extLst>
-          </p:cNvPr>
-          <p:cNvCxnSpPr/>
-          <p:nvPr/>
-        </p:nvCxnSpPr>
-        <p:spPr>
-          <a:xfrm>
-            <a:off x="0" y="1241861"/>
-            <a:ext cx="7956300" cy="0"/>
-          </a:xfrm>
-          <a:prstGeom prst="straightConnector1">
-            <a:avLst/>
-          </a:prstGeom>
-          <a:noFill/>
-          <a:ln w="38100" cap="flat" cmpd="sng">
-            <a:solidFill>
-              <a:srgbClr val="FF0000"/>
-            </a:solidFill>
-            <a:prstDash val="solid"/>
-            <a:round/>
-            <a:headEnd type="none" w="sm" len="sm"/>
-            <a:tailEnd type="none" w="sm" len="sm"/>
-          </a:ln>
-        </p:spPr>
-      </p:cxnSp>
-      <p:sp>
-        <p:nvSpPr>
-          <p:cNvPr id="3" name="TextBox 2">
-            <a:extLst>
-              <a:ext uri="{FF2B5EF4-FFF2-40B4-BE49-F238E27FC236}">
-                <a16:creationId xmlns:a16="http://schemas.microsoft.com/office/drawing/2014/main" id="{6B51A9AF-B27A-F16D-6F13-5F9DD038AC8D}"/>
-              </a:ext>
-            </a:extLst>
-          </p:cNvPr>
-          <p:cNvSpPr txBox="1"/>
-          <p:nvPr/>
-        </p:nvSpPr>
-        <p:spPr>
-          <a:xfrm>
-            <a:off x="195943" y="1660382"/>
-            <a:ext cx="6955971" cy="3693319"/>
-          </a:xfrm>
-          <a:prstGeom prst="rect">
-            <a:avLst/>
-          </a:prstGeom>
-          <a:noFill/>
-        </p:spPr>
-        <p:txBody>
-          <a:bodyPr wrap="square">
-            <a:spAutoFit/>
-          </a:bodyPr>
-          <a:lstStyle/>
-          <a:p>
-            <a:r>
-              <a:rPr lang="en-US" i="1" dirty="0">
-                <a:solidFill>
-                  <a:schemeClr val="bg1"/>
-                </a:solidFill>
-              </a:rPr>
-              <a:t>Why Random Forest?</a:t>
-            </a:r>
-          </a:p>
-          <a:p>
-            <a:endParaRPr lang="en-US" dirty="0">
-              <a:solidFill>
-                <a:schemeClr val="bg1"/>
-              </a:solidFill>
-            </a:endParaRPr>
-          </a:p>
-          <a:p>
-            <a:pPr>
-              <a:buFont typeface="Arial" panose="020B0604020202020204" pitchFamily="34" charset="0"/>
-              <a:buChar char="•"/>
-            </a:pPr>
-            <a:r>
-              <a:rPr lang="en-US" dirty="0">
-                <a:solidFill>
-                  <a:schemeClr val="bg1"/>
-                </a:solidFill>
-              </a:rPr>
-              <a:t>  Best Performance: Achieved the highest accuracy for predicting wine quality (both red and white wines)</a:t>
-            </a:r>
-          </a:p>
-          <a:p>
-            <a:pPr>
-              <a:buFont typeface="Arial" panose="020B0604020202020204" pitchFamily="34" charset="0"/>
-              <a:buChar char="•"/>
-            </a:pPr>
-            <a:endParaRPr lang="en-US" dirty="0">
-              <a:solidFill>
-                <a:schemeClr val="bg1"/>
-              </a:solidFill>
-            </a:endParaRPr>
-          </a:p>
-          <a:p>
-            <a:pPr>
-              <a:buFont typeface="Arial" panose="020B0604020202020204" pitchFamily="34" charset="0"/>
-              <a:buChar char="•"/>
-            </a:pPr>
-            <a:r>
-              <a:rPr lang="en-US" dirty="0">
-                <a:solidFill>
-                  <a:schemeClr val="bg1"/>
-                </a:solidFill>
-              </a:rPr>
-              <a:t>  Robustness: Handles complex feature interactions better than simpler models</a:t>
-            </a:r>
-          </a:p>
-          <a:p>
-            <a:pPr>
-              <a:buFont typeface="Arial" panose="020B0604020202020204" pitchFamily="34" charset="0"/>
-              <a:buChar char="•"/>
-            </a:pPr>
-            <a:endParaRPr lang="en-US" dirty="0">
-              <a:solidFill>
-                <a:schemeClr val="bg1"/>
-              </a:solidFill>
-            </a:endParaRPr>
-          </a:p>
-          <a:p>
-            <a:pPr>
-              <a:buFont typeface="Arial" panose="020B0604020202020204" pitchFamily="34" charset="0"/>
-              <a:buChar char="•"/>
-            </a:pPr>
-            <a:r>
-              <a:rPr lang="en-US" dirty="0">
-                <a:solidFill>
-                  <a:schemeClr val="bg1"/>
-                </a:solidFill>
-              </a:rPr>
-              <a:t>  Comparative Advantage: Outperformed models like Logistic Regression and Support Vector Machines (SVM)</a:t>
-            </a:r>
-          </a:p>
-          <a:p>
-            <a:pPr>
-              <a:buFont typeface="Arial" panose="020B0604020202020204" pitchFamily="34" charset="0"/>
-              <a:buChar char="•"/>
-            </a:pPr>
-            <a:endParaRPr lang="en-US" dirty="0">
-              <a:solidFill>
-                <a:schemeClr val="bg1"/>
-              </a:solidFill>
-            </a:endParaRPr>
-          </a:p>
-          <a:p>
-            <a:pPr>
-              <a:buFont typeface="Arial" panose="020B0604020202020204" pitchFamily="34" charset="0"/>
-              <a:buChar char="•"/>
-            </a:pPr>
-            <a:r>
-              <a:rPr lang="en-US" dirty="0">
-                <a:solidFill>
-                  <a:schemeClr val="bg1"/>
-                </a:solidFill>
-              </a:rPr>
-              <a:t>  Final Selection: Chosen due to its balance of accuracy, interpretability, and reliability</a:t>
-            </a:r>
-          </a:p>
-        </p:txBody>
-      </p:sp>
-      <p:pic>
-        <p:nvPicPr>
-          <p:cNvPr id="4" name="Picture 3" descr="A logo with a number in a circle with red lights&#10;&#10;AI-generated content may be incorrect.">
-            <a:extLst>
-              <a:ext uri="{FF2B5EF4-FFF2-40B4-BE49-F238E27FC236}">
-                <a16:creationId xmlns:a16="http://schemas.microsoft.com/office/drawing/2014/main" id="{C0BFE294-FD5E-89D3-9487-D656883C145B}"/>
-              </a:ext>
-            </a:extLst>
-          </p:cNvPr>
-          <p:cNvPicPr>
-            <a:picLocks noChangeAspect="1"/>
-          </p:cNvPicPr>
-          <p:nvPr/>
-        </p:nvPicPr>
-        <p:blipFill>
-          <a:blip r:embed="rId4">
-            <a:extLst>
-              <a:ext uri="{28A0092B-C50C-407E-A947-70E740481C1C}">
-                <a14:useLocalDpi xmlns:a14="http://schemas.microsoft.com/office/drawing/2010/main" val="0"/>
-              </a:ext>
-            </a:extLst>
-          </a:blip>
-          <a:stretch>
-            <a:fillRect/>
-          </a:stretch>
-        </p:blipFill>
-        <p:spPr>
-          <a:xfrm>
-            <a:off x="10512083" y="5178083"/>
-            <a:ext cx="1679917" cy="1679917"/>
-          </a:xfrm>
-          <a:prstGeom prst="rect">
-            <a:avLst/>
-          </a:prstGeom>
-        </p:spPr>
-      </p:pic>
-      <p:pic>
-        <p:nvPicPr>
-          <p:cNvPr id="5" name="Picture 4">
-            <a:extLst>
-              <a:ext uri="{FF2B5EF4-FFF2-40B4-BE49-F238E27FC236}">
-                <a16:creationId xmlns:a16="http://schemas.microsoft.com/office/drawing/2014/main" id="{DC0D8898-370F-F6A6-5A46-B52E5BC11EA2}"/>
-              </a:ext>
-            </a:extLst>
-          </p:cNvPr>
-          <p:cNvPicPr>
-            <a:picLocks noChangeAspect="1"/>
-          </p:cNvPicPr>
-          <p:nvPr/>
-        </p:nvPicPr>
-        <p:blipFill>
-          <a:blip r:embed="rId5"/>
-          <a:stretch>
-            <a:fillRect/>
-          </a:stretch>
-        </p:blipFill>
-        <p:spPr>
-          <a:xfrm>
-            <a:off x="7347857" y="1394164"/>
-            <a:ext cx="4696769" cy="3657320"/>
-          </a:xfrm>
-          <a:prstGeom prst="rect">
-            <a:avLst/>
-          </a:prstGeom>
-        </p:spPr>
-      </p:pic>
-    </p:spTree>
-    <p:extLst>
-      <p:ext uri="{BB962C8B-B14F-4D97-AF65-F5344CB8AC3E}">
-        <p14:creationId xmlns:p14="http://schemas.microsoft.com/office/powerpoint/2010/main" val="840948778"/>
-      </p:ext>
-    </p:extLst>
-  </p:cSld>
-  <p:clrMapOvr>
-    <a:masterClrMapping/>
-  </p:clrMapOvr>
-</p:sld>
-</file>
-
-<file path=ppt/slides/slide8.xml><?xml version="1.0" encoding="utf-8"?>
-<p:sld xmlns:a="http://schemas.openxmlformats.org/drawingml/2006/main" xmlns:r="http://schemas.openxmlformats.org/officeDocument/2006/relationships" xmlns:p="http://schemas.openxmlformats.org/presentationml/2006/main">
-  <p:cSld>
-    <p:spTree>
-      <p:nvGrpSpPr>
-        <p:cNvPr id="1" name="Shape 895">
-          <a:extLst>
-            <a:ext uri="{FF2B5EF4-FFF2-40B4-BE49-F238E27FC236}">
               <a16:creationId xmlns:a16="http://schemas.microsoft.com/office/drawing/2014/main" id="{87A8FA6B-0EA1-E1E5-0217-24EF3C31F47D}"/>
             </a:ext>
           </a:extLst>
@@ -9323,7 +8491,7 @@
 </p:sld>
 </file>
 
-<file path=ppt/slides/slide9.xml><?xml version="1.0" encoding="utf-8"?>
+<file path=ppt/slides/slide8.xml><?xml version="1.0" encoding="utf-8"?>
 <p:sld xmlns:a="http://schemas.openxmlformats.org/drawingml/2006/main" xmlns:r="http://schemas.openxmlformats.org/officeDocument/2006/relationships" xmlns:p="http://schemas.openxmlformats.org/presentationml/2006/main">
   <p:cSld>
     <p:spTree>
@@ -9972,6 +9140,143 @@
     <p:extLst>
       <p:ext uri="{BB962C8B-B14F-4D97-AF65-F5344CB8AC3E}">
         <p14:creationId xmlns:p14="http://schemas.microsoft.com/office/powerpoint/2010/main" val="3254388945"/>
+      </p:ext>
+    </p:extLst>
+  </p:cSld>
+  <p:clrMapOvr>
+    <a:masterClrMapping/>
+  </p:clrMapOvr>
+</p:sld>
+</file>
+
+<file path=ppt/slides/slide9.xml><?xml version="1.0" encoding="utf-8"?>
+<p:sld xmlns:a="http://schemas.openxmlformats.org/drawingml/2006/main" xmlns:r="http://schemas.openxmlformats.org/officeDocument/2006/relationships" xmlns:p="http://schemas.openxmlformats.org/presentationml/2006/main">
+  <p:cSld>
+    <p:spTree>
+      <p:nvGrpSpPr>
+        <p:cNvPr id="1" name="Shape 895">
+          <a:extLst>
+            <a:ext uri="{FF2B5EF4-FFF2-40B4-BE49-F238E27FC236}">
+              <a16:creationId xmlns:a16="http://schemas.microsoft.com/office/drawing/2014/main" id="{E895A9F3-9E4C-5BCD-BA6D-11FEE807F80A}"/>
+            </a:ext>
+          </a:extLst>
+        </p:cNvPr>
+        <p:cNvGrpSpPr/>
+        <p:nvPr/>
+      </p:nvGrpSpPr>
+      <p:grpSpPr>
+        <a:xfrm>
+          <a:off x="0" y="0"/>
+          <a:ext cx="0" cy="0"/>
+          <a:chOff x="0" y="0"/>
+          <a:chExt cx="0" cy="0"/>
+        </a:xfrm>
+      </p:grpSpPr>
+      <p:pic>
+        <p:nvPicPr>
+          <p:cNvPr id="896" name="Google Shape;896;g3290d45164b_0_508">
+            <a:extLst>
+              <a:ext uri="{FF2B5EF4-FFF2-40B4-BE49-F238E27FC236}">
+                <a16:creationId xmlns:a16="http://schemas.microsoft.com/office/drawing/2014/main" id="{4B511626-2370-A31E-B4FC-A110AC2C26CE}"/>
+              </a:ext>
+            </a:extLst>
+          </p:cNvPr>
+          <p:cNvPicPr preferRelativeResize="0"/>
+          <p:nvPr/>
+        </p:nvPicPr>
+        <p:blipFill rotWithShape="1">
+          <a:blip r:embed="rId3">
+            <a:alphaModFix/>
+          </a:blip>
+          <a:srcRect/>
+          <a:stretch/>
+        </p:blipFill>
+        <p:spPr>
+          <a:xfrm>
+            <a:off x="0" y="0"/>
+            <a:ext cx="12192000" cy="6858000"/>
+          </a:xfrm>
+          <a:prstGeom prst="rect">
+            <a:avLst/>
+          </a:prstGeom>
+          <a:noFill/>
+          <a:ln>
+            <a:noFill/>
+          </a:ln>
+        </p:spPr>
+      </p:pic>
+      <p:sp>
+        <p:nvSpPr>
+          <p:cNvPr id="2" name="Google Shape;904;g3290d45164b_0_508">
+            <a:extLst>
+              <a:ext uri="{FF2B5EF4-FFF2-40B4-BE49-F238E27FC236}">
+                <a16:creationId xmlns:a16="http://schemas.microsoft.com/office/drawing/2014/main" id="{D6A86359-9B40-0F30-9CEC-C585AD08F271}"/>
+              </a:ext>
+            </a:extLst>
+          </p:cNvPr>
+          <p:cNvSpPr txBox="1"/>
+          <p:nvPr/>
+        </p:nvSpPr>
+        <p:spPr>
+          <a:xfrm>
+            <a:off x="4276578" y="2691060"/>
+            <a:ext cx="4241409" cy="1015622"/>
+          </a:xfrm>
+          <a:prstGeom prst="rect">
+            <a:avLst/>
+          </a:prstGeom>
+          <a:noFill/>
+          <a:ln>
+            <a:noFill/>
+          </a:ln>
+        </p:spPr>
+        <p:txBody>
+          <a:bodyPr spcFirstLastPara="1" wrap="square" lIns="91425" tIns="45700" rIns="91425" bIns="45700" anchor="t" anchorCtr="0">
+            <a:spAutoFit/>
+          </a:bodyPr>
+          <a:lstStyle/>
+          <a:p>
+            <a:pPr marL="0" marR="0" lvl="0" indent="0" algn="l" rtl="0">
+              <a:lnSpc>
+                <a:spcPct val="100000"/>
+              </a:lnSpc>
+              <a:spcBef>
+                <a:spcPts val="0"/>
+              </a:spcBef>
+              <a:spcAft>
+                <a:spcPts val="0"/>
+              </a:spcAft>
+              <a:buClr>
+                <a:srgbClr val="FFFFFF"/>
+              </a:buClr>
+              <a:buSzPts val="4000"/>
+              <a:buFont typeface="Calibri"/>
+              <a:buNone/>
+            </a:pPr>
+            <a:r>
+              <a:rPr lang="en-US" sz="6000" dirty="0">
+                <a:solidFill>
+                  <a:schemeClr val="bg1"/>
+                </a:solidFill>
+              </a:rPr>
+              <a:t>Questions?</a:t>
+            </a:r>
+            <a:endParaRPr sz="6000" b="1" i="0" u="none" strike="noStrike" cap="none" dirty="0">
+              <a:solidFill>
+                <a:schemeClr val="lt1"/>
+              </a:solidFill>
+              <a:latin typeface="Roboto"/>
+              <a:ea typeface="Roboto"/>
+              <a:cs typeface="Roboto"/>
+              <a:sym typeface="Roboto"/>
+            </a:endParaRPr>
+          </a:p>
+        </p:txBody>
+      </p:sp>
+    </p:spTree>
+    <p:extLst>
+      <p:ext uri="{BB962C8B-B14F-4D97-AF65-F5344CB8AC3E}">
+        <p14:creationId xmlns:p14="http://schemas.microsoft.com/office/powerpoint/2010/main" val="601873375"/>
       </p:ext>
     </p:extLst>
   </p:cSld>

</xml_diff>

<commit_message>
Updated slides for final presentation
</commit_message>
<xml_diff>
--- a/Wine_Quality_Prediction.pptx
+++ b/Wine_Quality_Prediction.pptx
@@ -779,6 +779,198 @@
             <a:noAutofit/>
           </a:bodyPr>
           <a:lstStyle/>
+          <a:p>
+            <a:pPr algn="l">
+              <a:buFont typeface="Arial" panose="020B0604020202020204" pitchFamily="34" charset="0"/>
+              <a:buChar char="•"/>
+            </a:pPr>
+            <a:r>
+              <a:rPr lang="en-US" b="0" i="0" dirty="0">
+                <a:solidFill>
+                  <a:srgbClr val="D1D2D3"/>
+                </a:solidFill>
+                <a:effectLst/>
+                <a:latin typeface="Slack-Lato"/>
+              </a:rPr>
+              <a:t> [ ] Our team is excited to share our machine learning project, where we set out to predict  wine quality based on its chemical properties.</a:t>
+            </a:r>
+          </a:p>
+          <a:p>
+            <a:pPr algn="l">
+              <a:buFont typeface="Arial" panose="020B0604020202020204" pitchFamily="34" charset="0"/>
+              <a:buChar char="•"/>
+            </a:pPr>
+            <a:r>
+              <a:rPr lang="en-US" b="0" i="0" dirty="0">
+                <a:solidFill>
+                  <a:srgbClr val="D1D2D3"/>
+                </a:solidFill>
+                <a:effectLst/>
+                <a:latin typeface="Slack-Lato"/>
+              </a:rPr>
+              <a:t>[ ] We chose the UCI Wine Quality Dataset, which provided us with key measurements like acidity, alcohol content, and pH levels.</a:t>
+            </a:r>
+          </a:p>
+          <a:p>
+            <a:pPr algn="l">
+              <a:buFont typeface="Arial" panose="020B0604020202020204" pitchFamily="34" charset="0"/>
+              <a:buChar char="•"/>
+            </a:pPr>
+            <a:r>
+              <a:rPr lang="en-US" b="0" i="0" dirty="0">
+                <a:solidFill>
+                  <a:srgbClr val="D1D2D3"/>
+                </a:solidFill>
+                <a:effectLst/>
+                <a:latin typeface="Slack-Lato"/>
+              </a:rPr>
+              <a:t>[ ] Our goal was to not only build a model that accurately classifies wine quality but also understand which factors have the most impact.</a:t>
+            </a:r>
+          </a:p>
+          <a:p>
+            <a:pPr algn="l">
+              <a:buFont typeface="Arial" panose="020B0604020202020204" pitchFamily="34" charset="0"/>
+              <a:buChar char="•"/>
+            </a:pPr>
+            <a:r>
+              <a:rPr lang="en-US" b="0" i="0" dirty="0">
+                <a:solidFill>
+                  <a:srgbClr val="D1D2D3"/>
+                </a:solidFill>
+                <a:effectLst/>
+                <a:latin typeface="Slack-Lato"/>
+              </a:rPr>
+              <a:t>[ ] To achieve this, we followed a structured approach as Frank will share with you shortly, we cleaned and explored the data, ensuring it was ready </a:t>
+            </a:r>
+            <a:r>
+              <a:rPr lang="en-US" b="0" i="0" dirty="0" err="1">
+                <a:solidFill>
+                  <a:srgbClr val="D1D2D3"/>
+                </a:solidFill>
+                <a:effectLst/>
+                <a:latin typeface="Slack-Lato"/>
+              </a:rPr>
+              <a:t>bc</a:t>
+            </a:r>
+            <a:r>
+              <a:rPr lang="en-US" b="0" i="0" dirty="0">
+                <a:solidFill>
+                  <a:srgbClr val="D1D2D3"/>
+                </a:solidFill>
+                <a:effectLst/>
+                <a:latin typeface="Slack-Lato"/>
+              </a:rPr>
+              <a:t> or analysis.</a:t>
+            </a:r>
+          </a:p>
+          <a:p>
+            <a:pPr algn="l">
+              <a:buFont typeface="Arial" panose="020B0604020202020204" pitchFamily="34" charset="0"/>
+              <a:buChar char="•"/>
+            </a:pPr>
+            <a:r>
+              <a:rPr lang="en-US" b="0" i="0" dirty="0">
+                <a:solidFill>
+                  <a:srgbClr val="D1D2D3"/>
+                </a:solidFill>
+                <a:effectLst/>
+                <a:latin typeface="Slack-Lato"/>
+              </a:rPr>
+              <a:t>[ ] As David will share, we then tested multiple machine learning models- Random forest, </a:t>
+            </a:r>
+            <a:r>
+              <a:rPr lang="en-US" b="0" i="0" dirty="0" err="1">
+                <a:solidFill>
+                  <a:srgbClr val="D1D2D3"/>
+                </a:solidFill>
+                <a:effectLst/>
+                <a:latin typeface="Slack-Lato"/>
+              </a:rPr>
+              <a:t>KNN,Decision</a:t>
+            </a:r>
+            <a:r>
+              <a:rPr lang="en-US" b="0" i="0" dirty="0">
+                <a:solidFill>
+                  <a:srgbClr val="D1D2D3"/>
+                </a:solidFill>
+                <a:effectLst/>
+                <a:latin typeface="Slack-Lato"/>
+              </a:rPr>
+              <a:t> tree, Logistic </a:t>
+            </a:r>
+            <a:r>
+              <a:rPr lang="en-US" b="0" i="0" dirty="0" err="1">
+                <a:solidFill>
+                  <a:srgbClr val="D1D2D3"/>
+                </a:solidFill>
+                <a:effectLst/>
+                <a:latin typeface="Slack-Lato"/>
+              </a:rPr>
+              <a:t>Regression,SVM</a:t>
+            </a:r>
+            <a:r>
+              <a:rPr lang="en-US" b="0" i="0" dirty="0">
+                <a:solidFill>
+                  <a:srgbClr val="D1D2D3"/>
+                </a:solidFill>
+                <a:effectLst/>
+                <a:latin typeface="Slack-Lato"/>
+              </a:rPr>
+              <a:t>.</a:t>
+            </a:r>
+          </a:p>
+          <a:p>
+            <a:pPr algn="l">
+              <a:buFont typeface="Arial" panose="020B0604020202020204" pitchFamily="34" charset="0"/>
+              <a:buChar char="•"/>
+            </a:pPr>
+            <a:r>
+              <a:rPr lang="en-US" b="0" i="0" dirty="0">
+                <a:solidFill>
+                  <a:srgbClr val="D1D2D3"/>
+                </a:solidFill>
+                <a:effectLst/>
+                <a:latin typeface="Slack-Lato"/>
+              </a:rPr>
+              <a:t>[ ] As Micheal will share in more in depth in our conclusion, Through this process we gained insights into both the science and behind the wine quality and the strengths of different classification algorithms.</a:t>
+            </a:r>
+          </a:p>
+          <a:p>
+            <a:pPr algn="l">
+              <a:buFont typeface="Arial" panose="020B0604020202020204" pitchFamily="34" charset="0"/>
+              <a:buChar char="•"/>
+            </a:pPr>
+            <a:r>
+              <a:rPr lang="en-US" b="0" i="0" dirty="0">
+                <a:solidFill>
+                  <a:srgbClr val="D1D2D3"/>
+                </a:solidFill>
+                <a:effectLst/>
+                <a:latin typeface="Slack-Lato"/>
+              </a:rPr>
+              <a:t>[ ] I’m going to hand it over to Frank so we can start to walk you all through our </a:t>
+            </a:r>
+            <a:r>
+              <a:rPr lang="en-US" b="0" i="0" dirty="0" err="1">
+                <a:solidFill>
+                  <a:srgbClr val="D1D2D3"/>
+                </a:solidFill>
+                <a:effectLst/>
+                <a:latin typeface="Slack-Lato"/>
+              </a:rPr>
+              <a:t>journey,share</a:t>
+            </a:r>
+            <a:r>
+              <a:rPr lang="en-US" b="0" i="0" dirty="0">
+                <a:solidFill>
+                  <a:srgbClr val="D1D2D3"/>
+                </a:solidFill>
+                <a:effectLst/>
+                <a:latin typeface="Slack-Lato"/>
+              </a:rPr>
+              <a:t> our findings, and discuss the key take aways from our evaluations.</a:t>
+            </a:r>
+          </a:p>
           <a:p>
             <a:pPr marL="0" lvl="0" indent="0" algn="l" rtl="0">
               <a:spcBef>

</xml_diff>